<commit_message>
#22: Add API to read portion font name
</commit_message>
<xml_diff>
--- a/tests/ShapeCrawler.UnitTests/Resource/001.pptx
+++ b/tests/ShapeCrawler.UnitTests/Resource/001.pptx
@@ -262,7 +262,7 @@
           <a:p>
             <a:fld id="{6A2D1428-0459-4F75-829F-043936AE8C9E}" type="datetimeFigureOut">
               <a:rPr lang="en-US" smtClean="0"/>
-              <a:t>12/23/2020</a:t>
+              <a:t>12/29/2020</a:t>
             </a:fld>
             <a:endParaRPr lang="en-US"/>
           </a:p>
@@ -462,7 +462,7 @@
           <a:p>
             <a:fld id="{6A2D1428-0459-4F75-829F-043936AE8C9E}" type="datetimeFigureOut">
               <a:rPr lang="en-US" smtClean="0"/>
-              <a:t>12/23/2020</a:t>
+              <a:t>12/29/2020</a:t>
             </a:fld>
             <a:endParaRPr lang="en-US"/>
           </a:p>
@@ -672,7 +672,7 @@
           <a:p>
             <a:fld id="{6A2D1428-0459-4F75-829F-043936AE8C9E}" type="datetimeFigureOut">
               <a:rPr lang="en-US" smtClean="0"/>
-              <a:t>12/23/2020</a:t>
+              <a:t>12/29/2020</a:t>
             </a:fld>
             <a:endParaRPr lang="en-US"/>
           </a:p>
@@ -872,7 +872,7 @@
           <a:p>
             <a:fld id="{6A2D1428-0459-4F75-829F-043936AE8C9E}" type="datetimeFigureOut">
               <a:rPr lang="en-US" smtClean="0"/>
-              <a:t>12/23/2020</a:t>
+              <a:t>12/29/2020</a:t>
             </a:fld>
             <a:endParaRPr lang="en-US"/>
           </a:p>
@@ -1148,7 +1148,7 @@
           <a:p>
             <a:fld id="{6A2D1428-0459-4F75-829F-043936AE8C9E}" type="datetimeFigureOut">
               <a:rPr lang="en-US" smtClean="0"/>
-              <a:t>12/23/2020</a:t>
+              <a:t>12/29/2020</a:t>
             </a:fld>
             <a:endParaRPr lang="en-US"/>
           </a:p>
@@ -1416,7 +1416,7 @@
           <a:p>
             <a:fld id="{6A2D1428-0459-4F75-829F-043936AE8C9E}" type="datetimeFigureOut">
               <a:rPr lang="en-US" smtClean="0"/>
-              <a:t>12/23/2020</a:t>
+              <a:t>12/29/2020</a:t>
             </a:fld>
             <a:endParaRPr lang="en-US"/>
           </a:p>
@@ -1831,7 +1831,7 @@
           <a:p>
             <a:fld id="{6A2D1428-0459-4F75-829F-043936AE8C9E}" type="datetimeFigureOut">
               <a:rPr lang="en-US" smtClean="0"/>
-              <a:t>12/23/2020</a:t>
+              <a:t>12/29/2020</a:t>
             </a:fld>
             <a:endParaRPr lang="en-US"/>
           </a:p>
@@ -1973,7 +1973,7 @@
           <a:p>
             <a:fld id="{6A2D1428-0459-4F75-829F-043936AE8C9E}" type="datetimeFigureOut">
               <a:rPr lang="en-US" smtClean="0"/>
-              <a:t>12/23/2020</a:t>
+              <a:t>12/29/2020</a:t>
             </a:fld>
             <a:endParaRPr lang="en-US"/>
           </a:p>
@@ -2086,7 +2086,7 @@
           <a:p>
             <a:fld id="{6A2D1428-0459-4F75-829F-043936AE8C9E}" type="datetimeFigureOut">
               <a:rPr lang="en-US" smtClean="0"/>
-              <a:t>12/23/2020</a:t>
+              <a:t>12/29/2020</a:t>
             </a:fld>
             <a:endParaRPr lang="en-US"/>
           </a:p>
@@ -2399,7 +2399,7 @@
           <a:p>
             <a:fld id="{6A2D1428-0459-4F75-829F-043936AE8C9E}" type="datetimeFigureOut">
               <a:rPr lang="en-US" smtClean="0"/>
-              <a:t>12/23/2020</a:t>
+              <a:t>12/29/2020</a:t>
             </a:fld>
             <a:endParaRPr lang="en-US"/>
           </a:p>
@@ -2688,7 +2688,7 @@
           <a:p>
             <a:fld id="{6A2D1428-0459-4F75-829F-043936AE8C9E}" type="datetimeFigureOut">
               <a:rPr lang="en-US" smtClean="0"/>
-              <a:t>12/23/2020</a:t>
+              <a:t>12/29/2020</a:t>
             </a:fld>
             <a:endParaRPr lang="en-US"/>
           </a:p>
@@ -2931,7 +2931,7 @@
           <a:p>
             <a:fld id="{6A2D1428-0459-4F75-829F-043936AE8C9E}" type="datetimeFigureOut">
               <a:rPr lang="en-US" smtClean="0"/>
-              <a:t>12/23/2020</a:t>
+              <a:t>12/29/2020</a:t>
             </a:fld>
             <a:endParaRPr lang="en-US"/>
           </a:p>
@@ -3375,26 +3375,50 @@
       </p:sp>
       <p:sp>
         <p:nvSpPr>
-          <p:cNvPr id="3" name="Подзаголовок 2">
-            <a:extLst>
-              <a:ext uri="{FF2B5EF4-FFF2-40B4-BE49-F238E27FC236}">
-                <a16:creationId xmlns:a16="http://schemas.microsoft.com/office/drawing/2014/main" id="{B900F4E3-959E-446E-97E2-12C6BC0D4EFF}"/>
-              </a:ext>
-            </a:extLst>
-          </p:cNvPr>
-          <p:cNvSpPr>
-            <a:spLocks noGrp="1"/>
-          </p:cNvSpPr>
-          <p:nvPr>
-            <p:ph type="subTitle" idx="1"/>
-          </p:nvPr>
-        </p:nvSpPr>
-        <p:spPr/>
-        <p:txBody>
-          <a:bodyPr/>
-          <a:lstStyle/>
-          <a:p>
-            <a:endParaRPr lang="en-US"/>
+          <p:cNvPr id="4" name="TextBox 3">
+            <a:extLst>
+              <a:ext uri="{FF2B5EF4-FFF2-40B4-BE49-F238E27FC236}">
+                <a16:creationId xmlns:a16="http://schemas.microsoft.com/office/drawing/2014/main" id="{59671C7B-6D7A-4476-87B6-498941D34D17}"/>
+              </a:ext>
+            </a:extLst>
+          </p:cNvPr>
+          <p:cNvSpPr txBox="1"/>
+          <p:nvPr/>
+        </p:nvSpPr>
+        <p:spPr>
+          <a:xfrm>
+            <a:off x="1524000" y="4040554"/>
+            <a:ext cx="1281723" cy="369332"/>
+          </a:xfrm>
+          <a:prstGeom prst="rect">
+            <a:avLst/>
+          </a:prstGeom>
+        </p:spPr>
+        <p:style>
+          <a:lnRef idx="2">
+            <a:schemeClr val="dk1"/>
+          </a:lnRef>
+          <a:fillRef idx="1">
+            <a:schemeClr val="lt1"/>
+          </a:fillRef>
+          <a:effectRef idx="0">
+            <a:schemeClr val="dk1"/>
+          </a:effectRef>
+          <a:fontRef idx="minor">
+            <a:schemeClr val="dk1"/>
+          </a:fontRef>
+        </p:style>
+        <p:txBody>
+          <a:bodyPr wrap="square" rtlCol="0">
+            <a:spAutoFit/>
+          </a:bodyPr>
+          <a:lstStyle/>
+          <a:p>
+            <a:r>
+              <a:rPr lang="en-US" dirty="0"/>
+              <a:t>id4</a:t>
+            </a:r>
+            <a:endParaRPr lang="ru-RU" dirty="0"/>
           </a:p>
         </p:txBody>
       </p:sp>
@@ -3532,110 +3556,16 @@
         <a:srgbClr val="954F72"/>
       </a:folHlink>
     </a:clrScheme>
-    <a:fontScheme name="Стандартная">
+    <a:fontScheme name="Custom 2">
       <a:majorFont>
-        <a:latin typeface="Calibri Light" panose="020F0302020204030204"/>
+        <a:latin typeface="Calibri Light"/>
         <a:ea typeface=""/>
         <a:cs typeface=""/>
-        <a:font script="Jpan" typeface="游ゴシック Light"/>
-        <a:font script="Hang" typeface="맑은 고딕"/>
-        <a:font script="Hans" typeface="等线 Light"/>
-        <a:font script="Hant" typeface="新細明體"/>
-        <a:font script="Arab" typeface="Times New Roman"/>
-        <a:font script="Hebr" typeface="Times New Roman"/>
-        <a:font script="Thai" typeface="Angsana New"/>
-        <a:font script="Ethi" typeface="Nyala"/>
-        <a:font script="Beng" typeface="Vrinda"/>
-        <a:font script="Gujr" typeface="Shruti"/>
-        <a:font script="Khmr" typeface="MoolBoran"/>
-        <a:font script="Knda" typeface="Tunga"/>
-        <a:font script="Guru" typeface="Raavi"/>
-        <a:font script="Cans" typeface="Euphemia"/>
-        <a:font script="Cher" typeface="Plantagenet Cherokee"/>
-        <a:font script="Yiii" typeface="Microsoft Yi Baiti"/>
-        <a:font script="Tibt" typeface="Microsoft Himalaya"/>
-        <a:font script="Thaa" typeface="MV Boli"/>
-        <a:font script="Deva" typeface="Mangal"/>
-        <a:font script="Telu" typeface="Gautami"/>
-        <a:font script="Taml" typeface="Latha"/>
-        <a:font script="Syrc" typeface="Estrangelo Edessa"/>
-        <a:font script="Orya" typeface="Kalinga"/>
-        <a:font script="Mlym" typeface="Kartika"/>
-        <a:font script="Laoo" typeface="DokChampa"/>
-        <a:font script="Sinh" typeface="Iskoola Pota"/>
-        <a:font script="Mong" typeface="Mongolian Baiti"/>
-        <a:font script="Viet" typeface="Times New Roman"/>
-        <a:font script="Uigh" typeface="Microsoft Uighur"/>
-        <a:font script="Geor" typeface="Sylfaen"/>
-        <a:font script="Armn" typeface="Arial"/>
-        <a:font script="Bugi" typeface="Leelawadee UI"/>
-        <a:font script="Bopo" typeface="Microsoft JhengHei"/>
-        <a:font script="Java" typeface="Javanese Text"/>
-        <a:font script="Lisu" typeface="Segoe UI"/>
-        <a:font script="Mymr" typeface="Myanmar Text"/>
-        <a:font script="Nkoo" typeface="Ebrima"/>
-        <a:font script="Olck" typeface="Nirmala UI"/>
-        <a:font script="Osma" typeface="Ebrima"/>
-        <a:font script="Phag" typeface="Phagspa"/>
-        <a:font script="Syrn" typeface="Estrangelo Edessa"/>
-        <a:font script="Syrj" typeface="Estrangelo Edessa"/>
-        <a:font script="Syre" typeface="Estrangelo Edessa"/>
-        <a:font script="Sora" typeface="Nirmala UI"/>
-        <a:font script="Tale" typeface="Microsoft Tai Le"/>
-        <a:font script="Talu" typeface="Microsoft New Tai Lue"/>
-        <a:font script="Tfng" typeface="Ebrima"/>
       </a:majorFont>
       <a:minorFont>
-        <a:latin typeface="Calibri" panose="020F0502020204030204"/>
+        <a:latin typeface="Broadway"/>
         <a:ea typeface=""/>
         <a:cs typeface=""/>
-        <a:font script="Jpan" typeface="游ゴシック"/>
-        <a:font script="Hang" typeface="맑은 고딕"/>
-        <a:font script="Hans" typeface="等线"/>
-        <a:font script="Hant" typeface="新細明體"/>
-        <a:font script="Arab" typeface="Arial"/>
-        <a:font script="Hebr" typeface="Arial"/>
-        <a:font script="Thai" typeface="Cordia New"/>
-        <a:font script="Ethi" typeface="Nyala"/>
-        <a:font script="Beng" typeface="Vrinda"/>
-        <a:font script="Gujr" typeface="Shruti"/>
-        <a:font script="Khmr" typeface="DaunPenh"/>
-        <a:font script="Knda" typeface="Tunga"/>
-        <a:font script="Guru" typeface="Raavi"/>
-        <a:font script="Cans" typeface="Euphemia"/>
-        <a:font script="Cher" typeface="Plantagenet Cherokee"/>
-        <a:font script="Yiii" typeface="Microsoft Yi Baiti"/>
-        <a:font script="Tibt" typeface="Microsoft Himalaya"/>
-        <a:font script="Thaa" typeface="MV Boli"/>
-        <a:font script="Deva" typeface="Mangal"/>
-        <a:font script="Telu" typeface="Gautami"/>
-        <a:font script="Taml" typeface="Latha"/>
-        <a:font script="Syrc" typeface="Estrangelo Edessa"/>
-        <a:font script="Orya" typeface="Kalinga"/>
-        <a:font script="Mlym" typeface="Kartika"/>
-        <a:font script="Laoo" typeface="DokChampa"/>
-        <a:font script="Sinh" typeface="Iskoola Pota"/>
-        <a:font script="Mong" typeface="Mongolian Baiti"/>
-        <a:font script="Viet" typeface="Arial"/>
-        <a:font script="Uigh" typeface="Microsoft Uighur"/>
-        <a:font script="Geor" typeface="Sylfaen"/>
-        <a:font script="Armn" typeface="Arial"/>
-        <a:font script="Bugi" typeface="Leelawadee UI"/>
-        <a:font script="Bopo" typeface="Microsoft JhengHei"/>
-        <a:font script="Java" typeface="Javanese Text"/>
-        <a:font script="Lisu" typeface="Segoe UI"/>
-        <a:font script="Mymr" typeface="Myanmar Text"/>
-        <a:font script="Nkoo" typeface="Ebrima"/>
-        <a:font script="Olck" typeface="Nirmala UI"/>
-        <a:font script="Osma" typeface="Ebrima"/>
-        <a:font script="Phag" typeface="Phagspa"/>
-        <a:font script="Syrn" typeface="Estrangelo Edessa"/>
-        <a:font script="Syrj" typeface="Estrangelo Edessa"/>
-        <a:font script="Syre" typeface="Estrangelo Edessa"/>
-        <a:font script="Sora" typeface="Nirmala UI"/>
-        <a:font script="Tale" typeface="Microsoft Tai Le"/>
-        <a:font script="Talu" typeface="Microsoft New Tai Lue"/>
-        <a:font script="Tfng" typeface="Ebrima"/>
       </a:minorFont>
     </a:fontScheme>
     <a:fmtScheme name="Стандартная">

</xml_diff>

<commit_message>
#82: Add API to edit portion font name
</commit_message>
<xml_diff>
--- a/tests/ShapeCrawler.UnitTests/Resource/001.pptx
+++ b/tests/ShapeCrawler.UnitTests/Resource/001.pptx
@@ -7,6 +7,7 @@
   <p:sldIdLst>
     <p:sldId id="256" r:id="rId2"/>
     <p:sldId id="257" r:id="rId3"/>
+    <p:sldId id="258" r:id="rId4"/>
   </p:sldIdLst>
   <p:sldSz cx="12192000" cy="6858000"/>
   <p:notesSz cx="6858000" cy="9144000"/>
@@ -114,7 +115,7 @@
 </file>
 
 <file path=ppt/slideLayouts/slideLayout1.xml><?xml version="1.0" encoding="utf-8"?>
-<p:sldLayout xmlns:a="http://schemas.openxmlformats.org/drawingml/2006/main" xmlns:r="http://schemas.openxmlformats.org/officeDocument/2006/relationships" xmlns:p="http://schemas.openxmlformats.org/presentationml/2006/main" type="title" preserve="1">
+<p:sldLayout xmlns:a="http://schemas.openxmlformats.org/drawingml/2006/main" xmlns:r="http://schemas.openxmlformats.org/officeDocument/2006/relationships" xmlns:p="http://schemas.openxmlformats.org/presentationml/2006/main" preserve="1" userDrawn="1">
   <p:cSld name="Титульный слайд">
     <p:spTree>
       <p:nvGrpSpPr>
@@ -262,7 +263,7 @@
           <a:p>
             <a:fld id="{6A2D1428-0459-4F75-829F-043936AE8C9E}" type="datetimeFigureOut">
               <a:rPr lang="en-US" smtClean="0"/>
-              <a:t>12/29/2020</a:t>
+              <a:t>1/5/2021</a:t>
             </a:fld>
             <a:endParaRPr lang="en-US"/>
           </a:p>
@@ -319,6 +320,62 @@
               <a:t>‹#›</a:t>
             </a:fld>
             <a:endParaRPr lang="en-US"/>
+          </a:p>
+        </p:txBody>
+      </p:sp>
+      <p:sp>
+        <p:nvSpPr>
+          <p:cNvPr id="8" name="Text Placeholder 7">
+            <a:extLst>
+              <a:ext uri="{FF2B5EF4-FFF2-40B4-BE49-F238E27FC236}">
+                <a16:creationId xmlns:a16="http://schemas.microsoft.com/office/drawing/2014/main" id="{4DB2896B-7188-4BEC-8A13-68828FCD2590}"/>
+              </a:ext>
+            </a:extLst>
+          </p:cNvPr>
+          <p:cNvSpPr>
+            <a:spLocks noGrp="1"/>
+          </p:cNvSpPr>
+          <p:nvPr>
+            <p:ph type="body" sz="quarter" idx="13" hasCustomPrompt="1"/>
+          </p:nvPr>
+        </p:nvSpPr>
+        <p:spPr>
+          <a:xfrm>
+            <a:off x="1523999" y="468313"/>
+            <a:ext cx="4306277" cy="454025"/>
+          </a:xfrm>
+        </p:spPr>
+        <p:style>
+          <a:lnRef idx="2">
+            <a:schemeClr val="dk1"/>
+          </a:lnRef>
+          <a:fillRef idx="1">
+            <a:schemeClr val="lt1"/>
+          </a:fillRef>
+          <a:effectRef idx="0">
+            <a:schemeClr val="dk1"/>
+          </a:effectRef>
+          <a:fontRef idx="minor">
+            <a:schemeClr val="dk1"/>
+          </a:fontRef>
+        </p:style>
+        <p:txBody>
+          <a:bodyPr/>
+          <a:lstStyle>
+            <a:lvl1pPr>
+              <a:defRPr>
+                <a:latin typeface="Arial" panose="020B0604020202020204" pitchFamily="34" charset="0"/>
+                <a:cs typeface="Arial" panose="020B0604020202020204" pitchFamily="34" charset="0"/>
+              </a:defRPr>
+            </a:lvl1pPr>
+          </a:lstStyle>
+          <a:p>
+            <a:pPr lvl="0"/>
+            <a:r>
+              <a:rPr lang="en-US" dirty="0"/>
+              <a:t>Placeholder</a:t>
+            </a:r>
+            <a:endParaRPr lang="ru-RU" dirty="0"/>
           </a:p>
         </p:txBody>
       </p:sp>
@@ -462,7 +519,7 @@
           <a:p>
             <a:fld id="{6A2D1428-0459-4F75-829F-043936AE8C9E}" type="datetimeFigureOut">
               <a:rPr lang="en-US" smtClean="0"/>
-              <a:t>12/29/2020</a:t>
+              <a:t>1/5/2021</a:t>
             </a:fld>
             <a:endParaRPr lang="en-US"/>
           </a:p>
@@ -672,7 +729,7 @@
           <a:p>
             <a:fld id="{6A2D1428-0459-4F75-829F-043936AE8C9E}" type="datetimeFigureOut">
               <a:rPr lang="en-US" smtClean="0"/>
-              <a:t>12/29/2020</a:t>
+              <a:t>1/5/2021</a:t>
             </a:fld>
             <a:endParaRPr lang="en-US"/>
           </a:p>
@@ -872,7 +929,7 @@
           <a:p>
             <a:fld id="{6A2D1428-0459-4F75-829F-043936AE8C9E}" type="datetimeFigureOut">
               <a:rPr lang="en-US" smtClean="0"/>
-              <a:t>12/29/2020</a:t>
+              <a:t>1/5/2021</a:t>
             </a:fld>
             <a:endParaRPr lang="en-US"/>
           </a:p>
@@ -1148,7 +1205,7 @@
           <a:p>
             <a:fld id="{6A2D1428-0459-4F75-829F-043936AE8C9E}" type="datetimeFigureOut">
               <a:rPr lang="en-US" smtClean="0"/>
-              <a:t>12/29/2020</a:t>
+              <a:t>1/5/2021</a:t>
             </a:fld>
             <a:endParaRPr lang="en-US"/>
           </a:p>
@@ -1416,7 +1473,7 @@
           <a:p>
             <a:fld id="{6A2D1428-0459-4F75-829F-043936AE8C9E}" type="datetimeFigureOut">
               <a:rPr lang="en-US" smtClean="0"/>
-              <a:t>12/29/2020</a:t>
+              <a:t>1/5/2021</a:t>
             </a:fld>
             <a:endParaRPr lang="en-US"/>
           </a:p>
@@ -1831,7 +1888,7 @@
           <a:p>
             <a:fld id="{6A2D1428-0459-4F75-829F-043936AE8C9E}" type="datetimeFigureOut">
               <a:rPr lang="en-US" smtClean="0"/>
-              <a:t>12/29/2020</a:t>
+              <a:t>1/5/2021</a:t>
             </a:fld>
             <a:endParaRPr lang="en-US"/>
           </a:p>
@@ -1973,7 +2030,7 @@
           <a:p>
             <a:fld id="{6A2D1428-0459-4F75-829F-043936AE8C9E}" type="datetimeFigureOut">
               <a:rPr lang="en-US" smtClean="0"/>
-              <a:t>12/29/2020</a:t>
+              <a:t>1/5/2021</a:t>
             </a:fld>
             <a:endParaRPr lang="en-US"/>
           </a:p>
@@ -2086,7 +2143,7 @@
           <a:p>
             <a:fld id="{6A2D1428-0459-4F75-829F-043936AE8C9E}" type="datetimeFigureOut">
               <a:rPr lang="en-US" smtClean="0"/>
-              <a:t>12/29/2020</a:t>
+              <a:t>1/5/2021</a:t>
             </a:fld>
             <a:endParaRPr lang="en-US"/>
           </a:p>
@@ -2399,7 +2456,7 @@
           <a:p>
             <a:fld id="{6A2D1428-0459-4F75-829F-043936AE8C9E}" type="datetimeFigureOut">
               <a:rPr lang="en-US" smtClean="0"/>
-              <a:t>12/29/2020</a:t>
+              <a:t>1/5/2021</a:t>
             </a:fld>
             <a:endParaRPr lang="en-US"/>
           </a:p>
@@ -2688,7 +2745,7 @@
           <a:p>
             <a:fld id="{6A2D1428-0459-4F75-829F-043936AE8C9E}" type="datetimeFigureOut">
               <a:rPr lang="en-US" smtClean="0"/>
-              <a:t>12/29/2020</a:t>
+              <a:t>1/5/2021</a:t>
             </a:fld>
             <a:endParaRPr lang="en-US"/>
           </a:p>
@@ -2931,7 +2988,7 @@
           <a:p>
             <a:fld id="{6A2D1428-0459-4F75-829F-043936AE8C9E}" type="datetimeFigureOut">
               <a:rPr lang="en-US" smtClean="0"/>
-              <a:t>12/29/2020</a:t>
+              <a:t>1/5/2021</a:t>
             </a:fld>
             <a:endParaRPr lang="en-US"/>
           </a:p>
@@ -3515,6 +3572,117 @@
 </p:sld>
 </file>
 
+<file path=ppt/slides/slide3.xml><?xml version="1.0" encoding="utf-8"?>
+<p:sld xmlns:a="http://schemas.openxmlformats.org/drawingml/2006/main" xmlns:r="http://schemas.openxmlformats.org/officeDocument/2006/relationships" xmlns:p="http://schemas.openxmlformats.org/presentationml/2006/main">
+  <p:cSld>
+    <p:spTree>
+      <p:nvGrpSpPr>
+        <p:cNvPr id="1" name=""/>
+        <p:cNvGrpSpPr/>
+        <p:nvPr/>
+      </p:nvGrpSpPr>
+      <p:grpSpPr>
+        <a:xfrm>
+          <a:off x="0" y="0"/>
+          <a:ext cx="0" cy="0"/>
+          <a:chOff x="0" y="0"/>
+          <a:chExt cx="0" cy="0"/>
+        </a:xfrm>
+      </p:grpSpPr>
+      <p:sp>
+        <p:nvSpPr>
+          <p:cNvPr id="2" name="Title 1">
+            <a:extLst>
+              <a:ext uri="{FF2B5EF4-FFF2-40B4-BE49-F238E27FC236}">
+                <a16:creationId xmlns:a16="http://schemas.microsoft.com/office/drawing/2014/main" id="{CBA464C2-B69F-4FC8-BF7A-56BFB1AC4FD6}"/>
+              </a:ext>
+            </a:extLst>
+          </p:cNvPr>
+          <p:cNvSpPr>
+            <a:spLocks noGrp="1"/>
+          </p:cNvSpPr>
+          <p:nvPr>
+            <p:ph type="ctrTitle"/>
+          </p:nvPr>
+        </p:nvSpPr>
+        <p:spPr/>
+        <p:txBody>
+          <a:bodyPr/>
+          <a:lstStyle/>
+          <a:p>
+            <a:endParaRPr lang="ru-RU"/>
+          </a:p>
+        </p:txBody>
+      </p:sp>
+      <p:sp>
+        <p:nvSpPr>
+          <p:cNvPr id="3" name="Subtitle 2">
+            <a:extLst>
+              <a:ext uri="{FF2B5EF4-FFF2-40B4-BE49-F238E27FC236}">
+                <a16:creationId xmlns:a16="http://schemas.microsoft.com/office/drawing/2014/main" id="{94A09587-94D1-431A-979E-6BE109851F1F}"/>
+              </a:ext>
+            </a:extLst>
+          </p:cNvPr>
+          <p:cNvSpPr>
+            <a:spLocks noGrp="1"/>
+          </p:cNvSpPr>
+          <p:nvPr>
+            <p:ph type="subTitle" idx="1"/>
+          </p:nvPr>
+        </p:nvSpPr>
+        <p:spPr/>
+        <p:txBody>
+          <a:bodyPr/>
+          <a:lstStyle/>
+          <a:p>
+            <a:endParaRPr lang="ru-RU"/>
+          </a:p>
+        </p:txBody>
+      </p:sp>
+      <p:sp>
+        <p:nvSpPr>
+          <p:cNvPr id="4" name="Text Placeholder 3">
+            <a:extLst>
+              <a:ext uri="{FF2B5EF4-FFF2-40B4-BE49-F238E27FC236}">
+                <a16:creationId xmlns:a16="http://schemas.microsoft.com/office/drawing/2014/main" id="{D8E7B2B4-9D18-4FA5-9152-D3608241A3F0}"/>
+              </a:ext>
+            </a:extLst>
+          </p:cNvPr>
+          <p:cNvSpPr>
+            <a:spLocks noGrp="1"/>
+          </p:cNvSpPr>
+          <p:nvPr>
+            <p:ph type="body" sz="quarter" idx="13"/>
+          </p:nvPr>
+        </p:nvSpPr>
+        <p:spPr/>
+        <p:txBody>
+          <a:bodyPr>
+            <a:normAutofit lnSpcReduction="10000"/>
+          </a:bodyPr>
+          <a:lstStyle/>
+          <a:p>
+            <a:r>
+              <a:rPr lang="en-US" dirty="0"/>
+              <a:t>id4_Text place</a:t>
+            </a:r>
+            <a:endParaRPr lang="ru-RU" dirty="0"/>
+          </a:p>
+        </p:txBody>
+      </p:sp>
+    </p:spTree>
+    <p:extLst>
+      <p:ext uri="{BB962C8B-B14F-4D97-AF65-F5344CB8AC3E}">
+        <p14:creationId xmlns:p14="http://schemas.microsoft.com/office/powerpoint/2010/main" val="1879059270"/>
+      </p:ext>
+    </p:extLst>
+  </p:cSld>
+  <p:clrMapOvr>
+    <a:masterClrMapping/>
+  </p:clrMapOvr>
+</p:sld>
+</file>
+
 <file path=ppt/theme/theme1.xml><?xml version="1.0" encoding="utf-8"?>
 <a:theme xmlns:a="http://schemas.openxmlformats.org/drawingml/2006/main" name="Тема Office">
   <a:themeElements>

</xml_diff>